<commit_message>
planning phase --> flowcharts, circuits, architecture
</commit_message>
<xml_diff>
--- a/docs/planning/proj5_circuit_diagram.pptx
+++ b/docs/planning/proj5_circuit_diagram.pptx
@@ -115,7 +115,7 @@
 <file path=ppt/revisionInfo.xml><?xml version="1.0" encoding="utf-8"?>
 <p1510:revInfo xmlns:a="http://schemas.openxmlformats.org/drawingml/2006/main" xmlns:r="http://schemas.openxmlformats.org/officeDocument/2006/relationships" xmlns:p1510="http://schemas.microsoft.com/office/powerpoint/2015/10/main">
   <p1510:revLst>
-    <p1510:client id="{F5E6EC4E-0B58-4C6A-8D96-E4CA0A883DE5}" v="7" dt="2025-03-27T16:49:31.362"/>
+    <p1510:client id="{EA3D4833-2490-46CA-9B72-58AA6B3A474E}" v="5" dt="2025-04-01T16:50:14.246"/>
   </p1510:revLst>
 </p1510:revInfo>
 </file>
@@ -669,6 +669,198 @@
             <pc:docMk/>
             <pc:sldMk cId="2796565901" sldId="259"/>
             <ac:cxnSpMk id="1181" creationId="{83A20757-C832-E124-B681-7428BAA24685}"/>
+          </ac:cxnSpMkLst>
+        </pc:cxnChg>
+      </pc:sldChg>
+    </pc:docChg>
+  </pc:docChgLst>
+  <pc:docChgLst>
+    <pc:chgData name="Jay Graham" userId="95e8df3011c311b3" providerId="LiveId" clId="{EA3D4833-2490-46CA-9B72-58AA6B3A474E}"/>
+    <pc:docChg chg="undo custSel modSld">
+      <pc:chgData name="Jay Graham" userId="95e8df3011c311b3" providerId="LiveId" clId="{EA3D4833-2490-46CA-9B72-58AA6B3A474E}" dt="2025-04-01T16:50:19.361" v="92" actId="1076"/>
+      <pc:docMkLst>
+        <pc:docMk/>
+      </pc:docMkLst>
+      <pc:sldChg chg="addSp delSp modSp mod">
+        <pc:chgData name="Jay Graham" userId="95e8df3011c311b3" providerId="LiveId" clId="{EA3D4833-2490-46CA-9B72-58AA6B3A474E}" dt="2025-04-01T16:50:19.361" v="92" actId="1076"/>
+        <pc:sldMkLst>
+          <pc:docMk/>
+          <pc:sldMk cId="2796565901" sldId="259"/>
+        </pc:sldMkLst>
+        <pc:spChg chg="mod">
+          <ac:chgData name="Jay Graham" userId="95e8df3011c311b3" providerId="LiveId" clId="{EA3D4833-2490-46CA-9B72-58AA6B3A474E}" dt="2025-04-01T16:45:23.317" v="1" actId="14100"/>
+          <ac:spMkLst>
+            <pc:docMk/>
+            <pc:sldMk cId="2796565901" sldId="259"/>
+            <ac:spMk id="5" creationId="{E8DABF13-9BEC-618C-BC8C-DA089F67E0ED}"/>
+          </ac:spMkLst>
+        </pc:spChg>
+        <pc:spChg chg="mod">
+          <ac:chgData name="Jay Graham" userId="95e8df3011c311b3" providerId="LiveId" clId="{EA3D4833-2490-46CA-9B72-58AA6B3A474E}" dt="2025-04-01T16:45:30.110" v="2" actId="1076"/>
+          <ac:spMkLst>
+            <pc:docMk/>
+            <pc:sldMk cId="2796565901" sldId="259"/>
+            <ac:spMk id="6" creationId="{620CC3B6-4C0F-B448-7A18-1A499C755BA6}"/>
+          </ac:spMkLst>
+        </pc:spChg>
+        <pc:spChg chg="add mod">
+          <ac:chgData name="Jay Graham" userId="95e8df3011c311b3" providerId="LiveId" clId="{EA3D4833-2490-46CA-9B72-58AA6B3A474E}" dt="2025-04-01T16:46:51.569" v="54" actId="1076"/>
+          <ac:spMkLst>
+            <pc:docMk/>
+            <pc:sldMk cId="2796565901" sldId="259"/>
+            <ac:spMk id="14" creationId="{C27C4317-AB77-DB94-0761-3BAC61E38999}"/>
+          </ac:spMkLst>
+        </pc:spChg>
+        <pc:spChg chg="add mod">
+          <ac:chgData name="Jay Graham" userId="95e8df3011c311b3" providerId="LiveId" clId="{EA3D4833-2490-46CA-9B72-58AA6B3A474E}" dt="2025-04-01T16:46:54.575" v="55" actId="1076"/>
+          <ac:spMkLst>
+            <pc:docMk/>
+            <pc:sldMk cId="2796565901" sldId="259"/>
+            <ac:spMk id="15" creationId="{EDA8B567-2E77-46B4-AC8C-9FDD1390068F}"/>
+          </ac:spMkLst>
+        </pc:spChg>
+        <pc:spChg chg="add del mod">
+          <ac:chgData name="Jay Graham" userId="95e8df3011c311b3" providerId="LiveId" clId="{EA3D4833-2490-46CA-9B72-58AA6B3A474E}" dt="2025-04-01T16:47:23.044" v="76" actId="20577"/>
+          <ac:spMkLst>
+            <pc:docMk/>
+            <pc:sldMk cId="2796565901" sldId="259"/>
+            <ac:spMk id="16" creationId="{29474086-BCAD-D340-A6D1-72A96F22E73F}"/>
+          </ac:spMkLst>
+        </pc:spChg>
+        <pc:spChg chg="add del mod">
+          <ac:chgData name="Jay Graham" userId="95e8df3011c311b3" providerId="LiveId" clId="{EA3D4833-2490-46CA-9B72-58AA6B3A474E}" dt="2025-04-01T16:47:35.734" v="85" actId="20577"/>
+          <ac:spMkLst>
+            <pc:docMk/>
+            <pc:sldMk cId="2796565901" sldId="259"/>
+            <ac:spMk id="17" creationId="{1921EF80-A6D0-76BB-B693-804B1A1774FA}"/>
+          </ac:spMkLst>
+        </pc:spChg>
+        <pc:spChg chg="add del mod">
+          <ac:chgData name="Jay Graham" userId="95e8df3011c311b3" providerId="LiveId" clId="{EA3D4833-2490-46CA-9B72-58AA6B3A474E}" dt="2025-04-01T16:47:19.647" v="68" actId="20577"/>
+          <ac:spMkLst>
+            <pc:docMk/>
+            <pc:sldMk cId="2796565901" sldId="259"/>
+            <ac:spMk id="26" creationId="{92A555D6-4464-AE33-EA2D-E9C01570E6E8}"/>
+          </ac:spMkLst>
+        </pc:spChg>
+        <pc:spChg chg="add del mod">
+          <ac:chgData name="Jay Graham" userId="95e8df3011c311b3" providerId="LiveId" clId="{EA3D4833-2490-46CA-9B72-58AA6B3A474E}" dt="2025-04-01T16:47:11.206" v="60" actId="478"/>
+          <ac:spMkLst>
+            <pc:docMk/>
+            <pc:sldMk cId="2796565901" sldId="259"/>
+            <ac:spMk id="27" creationId="{EEC9F28A-9C0A-4C10-9B49-2A9DFCDB067C}"/>
+          </ac:spMkLst>
+        </pc:spChg>
+        <pc:spChg chg="add mod">
+          <ac:chgData name="Jay Graham" userId="95e8df3011c311b3" providerId="LiveId" clId="{EA3D4833-2490-46CA-9B72-58AA6B3A474E}" dt="2025-04-01T16:49:52.770" v="89" actId="20577"/>
+          <ac:spMkLst>
+            <pc:docMk/>
+            <pc:sldMk cId="2796565901" sldId="259"/>
+            <ac:spMk id="28" creationId="{E10A4152-DAC1-2BB1-2429-D091161552ED}"/>
+          </ac:spMkLst>
+        </pc:spChg>
+        <pc:spChg chg="add mod">
+          <ac:chgData name="Jay Graham" userId="95e8df3011c311b3" providerId="LiveId" clId="{EA3D4833-2490-46CA-9B72-58AA6B3A474E}" dt="2025-04-01T16:47:53.615" v="87" actId="1076"/>
+          <ac:spMkLst>
+            <pc:docMk/>
+            <pc:sldMk cId="2796565901" sldId="259"/>
+            <ac:spMk id="29" creationId="{637BB854-C7B9-A05D-89F6-EAB762B00F3C}"/>
+          </ac:spMkLst>
+        </pc:spChg>
+        <pc:spChg chg="add mod">
+          <ac:chgData name="Jay Graham" userId="95e8df3011c311b3" providerId="LiveId" clId="{EA3D4833-2490-46CA-9B72-58AA6B3A474E}" dt="2025-04-01T16:47:53.615" v="87" actId="1076"/>
+          <ac:spMkLst>
+            <pc:docMk/>
+            <pc:sldMk cId="2796565901" sldId="259"/>
+            <ac:spMk id="40" creationId="{FAAEA2F9-B6AA-3987-3959-25D32E50C203}"/>
+          </ac:spMkLst>
+        </pc:spChg>
+        <pc:spChg chg="mod">
+          <ac:chgData name="Jay Graham" userId="95e8df3011c311b3" providerId="LiveId" clId="{EA3D4833-2490-46CA-9B72-58AA6B3A474E}" dt="2025-04-01T16:45:18.675" v="0" actId="1076"/>
+          <ac:spMkLst>
+            <pc:docMk/>
+            <pc:sldMk cId="2796565901" sldId="259"/>
+            <ac:spMk id="1048" creationId="{66BA5D6A-1717-7CA8-2DB5-2670F94DA1E5}"/>
+          </ac:spMkLst>
+        </pc:spChg>
+        <pc:spChg chg="mod">
+          <ac:chgData name="Jay Graham" userId="95e8df3011c311b3" providerId="LiveId" clId="{EA3D4833-2490-46CA-9B72-58AA6B3A474E}" dt="2025-04-01T16:45:18.675" v="0" actId="1076"/>
+          <ac:spMkLst>
+            <pc:docMk/>
+            <pc:sldMk cId="2796565901" sldId="259"/>
+            <ac:spMk id="1049" creationId="{72E5B3DF-6F57-EC9C-9C17-C882866BDD92}"/>
+          </ac:spMkLst>
+        </pc:spChg>
+        <pc:spChg chg="mod">
+          <ac:chgData name="Jay Graham" userId="95e8df3011c311b3" providerId="LiveId" clId="{EA3D4833-2490-46CA-9B72-58AA6B3A474E}" dt="2025-04-01T16:45:18.675" v="0" actId="1076"/>
+          <ac:spMkLst>
+            <pc:docMk/>
+            <pc:sldMk cId="2796565901" sldId="259"/>
+            <ac:spMk id="1050" creationId="{682C4528-A060-4997-762F-E9DBC54D8ED7}"/>
+          </ac:spMkLst>
+        </pc:spChg>
+        <pc:spChg chg="mod">
+          <ac:chgData name="Jay Graham" userId="95e8df3011c311b3" providerId="LiveId" clId="{EA3D4833-2490-46CA-9B72-58AA6B3A474E}" dt="2025-04-01T16:45:18.675" v="0" actId="1076"/>
+          <ac:spMkLst>
+            <pc:docMk/>
+            <pc:sldMk cId="2796565901" sldId="259"/>
+            <ac:spMk id="1074" creationId="{36DC8D5B-CF6E-D10C-9FEA-A5AA7BD67E03}"/>
+          </ac:spMkLst>
+        </pc:spChg>
+        <pc:spChg chg="mod">
+          <ac:chgData name="Jay Graham" userId="95e8df3011c311b3" providerId="LiveId" clId="{EA3D4833-2490-46CA-9B72-58AA6B3A474E}" dt="2025-04-01T16:45:18.675" v="0" actId="1076"/>
+          <ac:spMkLst>
+            <pc:docMk/>
+            <pc:sldMk cId="2796565901" sldId="259"/>
+            <ac:spMk id="1075" creationId="{F4FFF203-92A3-DE4A-3F0F-0ECE38BF770C}"/>
+          </ac:spMkLst>
+        </pc:spChg>
+        <pc:spChg chg="mod">
+          <ac:chgData name="Jay Graham" userId="95e8df3011c311b3" providerId="LiveId" clId="{EA3D4833-2490-46CA-9B72-58AA6B3A474E}" dt="2025-04-01T16:45:18.675" v="0" actId="1076"/>
+          <ac:spMkLst>
+            <pc:docMk/>
+            <pc:sldMk cId="2796565901" sldId="259"/>
+            <ac:spMk id="1077" creationId="{0F3B6E57-BD19-660B-152D-A35C696B4A29}"/>
+          </ac:spMkLst>
+        </pc:spChg>
+        <pc:spChg chg="mod">
+          <ac:chgData name="Jay Graham" userId="95e8df3011c311b3" providerId="LiveId" clId="{EA3D4833-2490-46CA-9B72-58AA6B3A474E}" dt="2025-04-01T16:45:18.675" v="0" actId="1076"/>
+          <ac:spMkLst>
+            <pc:docMk/>
+            <pc:sldMk cId="2796565901" sldId="259"/>
+            <ac:spMk id="1080" creationId="{275A36FF-A02E-1DF4-87B5-46620D769C8A}"/>
+          </ac:spMkLst>
+        </pc:spChg>
+        <pc:spChg chg="mod">
+          <ac:chgData name="Jay Graham" userId="95e8df3011c311b3" providerId="LiveId" clId="{EA3D4833-2490-46CA-9B72-58AA6B3A474E}" dt="2025-04-01T16:45:18.675" v="0" actId="1076"/>
+          <ac:spMkLst>
+            <pc:docMk/>
+            <pc:sldMk cId="2796565901" sldId="259"/>
+            <ac:spMk id="1081" creationId="{D158BF25-C383-E8F4-523A-702B606B6ED1}"/>
+          </ac:spMkLst>
+        </pc:spChg>
+        <pc:cxnChg chg="add mod">
+          <ac:chgData name="Jay Graham" userId="95e8df3011c311b3" providerId="LiveId" clId="{EA3D4833-2490-46CA-9B72-58AA6B3A474E}" dt="2025-04-01T16:50:19.361" v="92" actId="1076"/>
+          <ac:cxnSpMkLst>
+            <pc:docMk/>
+            <pc:sldMk cId="2796565901" sldId="259"/>
+            <ac:cxnSpMk id="41" creationId="{6F5431DB-BCBF-0F42-3EAA-24D31AB96528}"/>
+          </ac:cxnSpMkLst>
+        </pc:cxnChg>
+        <pc:cxnChg chg="add mod">
+          <ac:chgData name="Jay Graham" userId="95e8df3011c311b3" providerId="LiveId" clId="{EA3D4833-2490-46CA-9B72-58AA6B3A474E}" dt="2025-04-01T16:50:19.361" v="92" actId="1076"/>
+          <ac:cxnSpMkLst>
+            <pc:docMk/>
+            <pc:sldMk cId="2796565901" sldId="259"/>
+            <ac:cxnSpMk id="42" creationId="{5C0107CF-1D9D-DECC-0F8A-64AC6A16F612}"/>
+          </ac:cxnSpMkLst>
+        </pc:cxnChg>
+        <pc:cxnChg chg="add mod">
+          <ac:chgData name="Jay Graham" userId="95e8df3011c311b3" providerId="LiveId" clId="{EA3D4833-2490-46CA-9B72-58AA6B3A474E}" dt="2025-04-01T16:50:19.361" v="92" actId="1076"/>
+          <ac:cxnSpMkLst>
+            <pc:docMk/>
+            <pc:sldMk cId="2796565901" sldId="259"/>
+            <ac:cxnSpMk id="43" creationId="{7BA8E72C-0DB9-1807-04FD-31DCA00F59E8}"/>
           </ac:cxnSpMkLst>
         </pc:cxnChg>
       </pc:sldChg>
@@ -1191,7 +1383,7 @@
           <a:p>
             <a:fld id="{298767BF-8302-47B2-9BB9-DDE0834E9382}" type="datetimeFigureOut">
               <a:rPr lang="en-US" smtClean="0"/>
-              <a:t>3/27/2025</a:t>
+              <a:t>4/1/2025</a:t>
             </a:fld>
             <a:endParaRPr lang="en-US"/>
           </a:p>
@@ -1389,7 +1581,7 @@
           <a:p>
             <a:fld id="{298767BF-8302-47B2-9BB9-DDE0834E9382}" type="datetimeFigureOut">
               <a:rPr lang="en-US" smtClean="0"/>
-              <a:t>3/27/2025</a:t>
+              <a:t>4/1/2025</a:t>
             </a:fld>
             <a:endParaRPr lang="en-US"/>
           </a:p>
@@ -1597,7 +1789,7 @@
           <a:p>
             <a:fld id="{298767BF-8302-47B2-9BB9-DDE0834E9382}" type="datetimeFigureOut">
               <a:rPr lang="en-US" smtClean="0"/>
-              <a:t>3/27/2025</a:t>
+              <a:t>4/1/2025</a:t>
             </a:fld>
             <a:endParaRPr lang="en-US"/>
           </a:p>
@@ -1795,7 +1987,7 @@
           <a:p>
             <a:fld id="{298767BF-8302-47B2-9BB9-DDE0834E9382}" type="datetimeFigureOut">
               <a:rPr lang="en-US" smtClean="0"/>
-              <a:t>3/27/2025</a:t>
+              <a:t>4/1/2025</a:t>
             </a:fld>
             <a:endParaRPr lang="en-US"/>
           </a:p>
@@ -2070,7 +2262,7 @@
           <a:p>
             <a:fld id="{298767BF-8302-47B2-9BB9-DDE0834E9382}" type="datetimeFigureOut">
               <a:rPr lang="en-US" smtClean="0"/>
-              <a:t>3/27/2025</a:t>
+              <a:t>4/1/2025</a:t>
             </a:fld>
             <a:endParaRPr lang="en-US"/>
           </a:p>
@@ -2335,7 +2527,7 @@
           <a:p>
             <a:fld id="{298767BF-8302-47B2-9BB9-DDE0834E9382}" type="datetimeFigureOut">
               <a:rPr lang="en-US" smtClean="0"/>
-              <a:t>3/27/2025</a:t>
+              <a:t>4/1/2025</a:t>
             </a:fld>
             <a:endParaRPr lang="en-US"/>
           </a:p>
@@ -2747,7 +2939,7 @@
           <a:p>
             <a:fld id="{298767BF-8302-47B2-9BB9-DDE0834E9382}" type="datetimeFigureOut">
               <a:rPr lang="en-US" smtClean="0"/>
-              <a:t>3/27/2025</a:t>
+              <a:t>4/1/2025</a:t>
             </a:fld>
             <a:endParaRPr lang="en-US"/>
           </a:p>
@@ -2888,7 +3080,7 @@
           <a:p>
             <a:fld id="{298767BF-8302-47B2-9BB9-DDE0834E9382}" type="datetimeFigureOut">
               <a:rPr lang="en-US" smtClean="0"/>
-              <a:t>3/27/2025</a:t>
+              <a:t>4/1/2025</a:t>
             </a:fld>
             <a:endParaRPr lang="en-US"/>
           </a:p>
@@ -3001,7 +3193,7 @@
           <a:p>
             <a:fld id="{298767BF-8302-47B2-9BB9-DDE0834E9382}" type="datetimeFigureOut">
               <a:rPr lang="en-US" smtClean="0"/>
-              <a:t>3/27/2025</a:t>
+              <a:t>4/1/2025</a:t>
             </a:fld>
             <a:endParaRPr lang="en-US"/>
           </a:p>
@@ -3312,7 +3504,7 @@
           <a:p>
             <a:fld id="{298767BF-8302-47B2-9BB9-DDE0834E9382}" type="datetimeFigureOut">
               <a:rPr lang="en-US" smtClean="0"/>
-              <a:t>3/27/2025</a:t>
+              <a:t>4/1/2025</a:t>
             </a:fld>
             <a:endParaRPr lang="en-US"/>
           </a:p>
@@ -3600,7 +3792,7 @@
           <a:p>
             <a:fld id="{298767BF-8302-47B2-9BB9-DDE0834E9382}" type="datetimeFigureOut">
               <a:rPr lang="en-US" smtClean="0"/>
-              <a:t>3/27/2025</a:t>
+              <a:t>4/1/2025</a:t>
             </a:fld>
             <a:endParaRPr lang="en-US"/>
           </a:p>
@@ -3841,7 +4033,7 @@
           <a:p>
             <a:fld id="{298767BF-8302-47B2-9BB9-DDE0834E9382}" type="datetimeFigureOut">
               <a:rPr lang="en-US" smtClean="0"/>
-              <a:t>3/27/2025</a:t>
+              <a:t>4/1/2025</a:t>
             </a:fld>
             <a:endParaRPr lang="en-US"/>
           </a:p>
@@ -4379,8 +4571,8 @@
         </p:nvSpPr>
         <p:spPr>
           <a:xfrm>
-            <a:off x="189736" y="1326610"/>
-            <a:ext cx="1666157" cy="4197113"/>
+            <a:off x="198895" y="650127"/>
+            <a:ext cx="1666157" cy="3711160"/>
           </a:xfrm>
           <a:prstGeom prst="rect">
             <a:avLst/>
@@ -4433,7 +4625,7 @@
         </p:nvSpPr>
         <p:spPr>
           <a:xfrm>
-            <a:off x="132659" y="1334277"/>
+            <a:off x="141818" y="611523"/>
             <a:ext cx="1780309" cy="369332"/>
           </a:xfrm>
           <a:prstGeom prst="rect">
@@ -4763,7 +4955,7 @@
         </p:nvSpPr>
         <p:spPr>
           <a:xfrm>
-            <a:off x="2527212" y="4135781"/>
+            <a:off x="2536371" y="2973345"/>
             <a:ext cx="672718" cy="348062"/>
           </a:xfrm>
           <a:prstGeom prst="rect">
@@ -4814,7 +5006,7 @@
         </p:nvSpPr>
         <p:spPr>
           <a:xfrm>
-            <a:off x="2527212" y="4483287"/>
+            <a:off x="2536371" y="3320851"/>
             <a:ext cx="672718" cy="348062"/>
           </a:xfrm>
           <a:prstGeom prst="rect">
@@ -4865,7 +5057,7 @@
         </p:nvSpPr>
         <p:spPr>
           <a:xfrm>
-            <a:off x="2527212" y="4831349"/>
+            <a:off x="2536371" y="3668913"/>
             <a:ext cx="672718" cy="348062"/>
           </a:xfrm>
           <a:prstGeom prst="rect">
@@ -4916,7 +5108,7 @@
         </p:nvSpPr>
         <p:spPr>
           <a:xfrm>
-            <a:off x="2527211" y="5178577"/>
+            <a:off x="2536370" y="4016141"/>
             <a:ext cx="672719" cy="348062"/>
           </a:xfrm>
           <a:prstGeom prst="rect">
@@ -4967,7 +5159,7 @@
         </p:nvSpPr>
         <p:spPr>
           <a:xfrm>
-            <a:off x="2527211" y="3439657"/>
+            <a:off x="2536370" y="2277221"/>
             <a:ext cx="672718" cy="348062"/>
           </a:xfrm>
           <a:prstGeom prst="rect">
@@ -5018,7 +5210,7 @@
         </p:nvSpPr>
         <p:spPr>
           <a:xfrm>
-            <a:off x="2527211" y="3092707"/>
+            <a:off x="2536370" y="1930271"/>
             <a:ext cx="672718" cy="348062"/>
           </a:xfrm>
           <a:prstGeom prst="rect">
@@ -5069,7 +5261,7 @@
         </p:nvSpPr>
         <p:spPr>
           <a:xfrm>
-            <a:off x="2527209" y="2743533"/>
+            <a:off x="2536368" y="1581097"/>
             <a:ext cx="672718" cy="348062"/>
           </a:xfrm>
           <a:prstGeom prst="rect">
@@ -5124,7 +5316,7 @@
         </p:nvCxnSpPr>
         <p:spPr>
           <a:xfrm>
-            <a:off x="1854629" y="4306896"/>
+            <a:off x="1863788" y="3144460"/>
             <a:ext cx="672583" cy="2916"/>
           </a:xfrm>
           <a:prstGeom prst="line">
@@ -5165,7 +5357,7 @@
         </p:nvCxnSpPr>
         <p:spPr>
           <a:xfrm>
-            <a:off x="1854629" y="4654402"/>
+            <a:off x="1863788" y="3491966"/>
             <a:ext cx="672583" cy="2916"/>
           </a:xfrm>
           <a:prstGeom prst="line">
@@ -5206,7 +5398,7 @@
         </p:nvCxnSpPr>
         <p:spPr>
           <a:xfrm>
-            <a:off x="1854629" y="5002464"/>
+            <a:off x="1863788" y="3840028"/>
             <a:ext cx="672583" cy="2916"/>
           </a:xfrm>
           <a:prstGeom prst="line">
@@ -5247,7 +5439,7 @@
         </p:nvCxnSpPr>
         <p:spPr>
           <a:xfrm>
-            <a:off x="1854629" y="5349692"/>
+            <a:off x="1863788" y="4187256"/>
             <a:ext cx="672582" cy="2916"/>
           </a:xfrm>
           <a:prstGeom prst="line">
@@ -5288,7 +5480,7 @@
         </p:nvCxnSpPr>
         <p:spPr>
           <a:xfrm flipV="1">
-            <a:off x="1860441" y="2917564"/>
+            <a:off x="1869600" y="1755128"/>
             <a:ext cx="666768" cy="2777"/>
           </a:xfrm>
           <a:prstGeom prst="line">
@@ -5329,7 +5521,7 @@
         </p:nvCxnSpPr>
         <p:spPr>
           <a:xfrm flipV="1">
-            <a:off x="1860441" y="3266738"/>
+            <a:off x="1869600" y="2104302"/>
             <a:ext cx="666770" cy="1665"/>
           </a:xfrm>
           <a:prstGeom prst="line">
@@ -5370,7 +5562,7 @@
         </p:nvCxnSpPr>
         <p:spPr>
           <a:xfrm flipV="1">
-            <a:off x="1860441" y="3613688"/>
+            <a:off x="1869600" y="2451252"/>
             <a:ext cx="666770" cy="1943"/>
           </a:xfrm>
           <a:prstGeom prst="line">
@@ -5411,7 +5603,7 @@
         </p:nvCxnSpPr>
         <p:spPr>
           <a:xfrm flipV="1">
-            <a:off x="1860441" y="2569363"/>
+            <a:off x="1869600" y="1406927"/>
             <a:ext cx="666768" cy="3472"/>
           </a:xfrm>
           <a:prstGeom prst="line">
@@ -5448,7 +5640,7 @@
         </p:nvSpPr>
         <p:spPr>
           <a:xfrm>
-            <a:off x="2527209" y="2395332"/>
+            <a:off x="2536368" y="1232896"/>
             <a:ext cx="672718" cy="348062"/>
           </a:xfrm>
           <a:prstGeom prst="rect">
@@ -5499,7 +5691,7 @@
         </p:nvSpPr>
         <p:spPr>
           <a:xfrm>
-            <a:off x="1187723" y="2398804"/>
+            <a:off x="1196882" y="1236368"/>
             <a:ext cx="672718" cy="348062"/>
           </a:xfrm>
           <a:prstGeom prst="rect">
@@ -5550,7 +5742,7 @@
         </p:nvSpPr>
         <p:spPr>
           <a:xfrm>
-            <a:off x="1187723" y="2746310"/>
+            <a:off x="1196882" y="1583874"/>
             <a:ext cx="672718" cy="348062"/>
           </a:xfrm>
           <a:prstGeom prst="rect">
@@ -5601,7 +5793,7 @@
         </p:nvSpPr>
         <p:spPr>
           <a:xfrm>
-            <a:off x="1187723" y="3094372"/>
+            <a:off x="1196882" y="1931936"/>
             <a:ext cx="672718" cy="348062"/>
           </a:xfrm>
           <a:prstGeom prst="rect">
@@ -5652,7 +5844,7 @@
         </p:nvSpPr>
         <p:spPr>
           <a:xfrm>
-            <a:off x="1187722" y="3441600"/>
+            <a:off x="1196881" y="2279164"/>
             <a:ext cx="672719" cy="348062"/>
           </a:xfrm>
           <a:prstGeom prst="rect">
@@ -5703,7 +5895,7 @@
         </p:nvSpPr>
         <p:spPr>
           <a:xfrm>
-            <a:off x="1181911" y="4132865"/>
+            <a:off x="1191070" y="2970429"/>
             <a:ext cx="672718" cy="348062"/>
           </a:xfrm>
           <a:prstGeom prst="rect">
@@ -5754,7 +5946,7 @@
         </p:nvSpPr>
         <p:spPr>
           <a:xfrm>
-            <a:off x="1181911" y="4480371"/>
+            <a:off x="1191070" y="3317935"/>
             <a:ext cx="672718" cy="348062"/>
           </a:xfrm>
           <a:prstGeom prst="rect">
@@ -5805,7 +5997,7 @@
         </p:nvSpPr>
         <p:spPr>
           <a:xfrm>
-            <a:off x="1181911" y="4828433"/>
+            <a:off x="1191070" y="3665997"/>
             <a:ext cx="672718" cy="348062"/>
           </a:xfrm>
           <a:prstGeom prst="rect">
@@ -5856,7 +6048,7 @@
         </p:nvSpPr>
         <p:spPr>
           <a:xfrm>
-            <a:off x="1181910" y="5175661"/>
+            <a:off x="1191069" y="4013225"/>
             <a:ext cx="672719" cy="348062"/>
           </a:xfrm>
           <a:prstGeom prst="rect">
@@ -9546,6 +9738,515 @@
           </a:p>
         </p:txBody>
       </p:sp>
+      <p:sp>
+        <p:nvSpPr>
+          <p:cNvPr id="14" name="Rectangle 13">
+            <a:extLst>
+              <a:ext uri="{FF2B5EF4-FFF2-40B4-BE49-F238E27FC236}">
+                <a16:creationId xmlns:a16="http://schemas.microsoft.com/office/drawing/2014/main" id="{C27C4317-AB77-DB94-0761-3BAC61E38999}"/>
+              </a:ext>
+            </a:extLst>
+          </p:cNvPr>
+          <p:cNvSpPr/>
+          <p:nvPr/>
+        </p:nvSpPr>
+        <p:spPr>
+          <a:xfrm>
+            <a:off x="205367" y="4537369"/>
+            <a:ext cx="1664233" cy="1608436"/>
+          </a:xfrm>
+          <a:prstGeom prst="rect">
+            <a:avLst/>
+          </a:prstGeom>
+          <a:solidFill>
+            <a:schemeClr val="accent2"/>
+          </a:solidFill>
+          <a:ln w="28575"/>
+        </p:spPr>
+        <p:style>
+          <a:lnRef idx="2">
+            <a:schemeClr val="accent1">
+              <a:shade val="15000"/>
+            </a:schemeClr>
+          </a:lnRef>
+          <a:fillRef idx="1">
+            <a:schemeClr val="accent1"/>
+          </a:fillRef>
+          <a:effectRef idx="0">
+            <a:schemeClr val="accent1"/>
+          </a:effectRef>
+          <a:fontRef idx="minor">
+            <a:schemeClr val="lt1"/>
+          </a:fontRef>
+        </p:style>
+        <p:txBody>
+          <a:bodyPr rtlCol="0" anchor="ctr"/>
+          <a:lstStyle/>
+          <a:p>
+            <a:pPr algn="ctr"/>
+            <a:endParaRPr lang="en-US" dirty="0"/>
+          </a:p>
+        </p:txBody>
+      </p:sp>
+      <p:sp>
+        <p:nvSpPr>
+          <p:cNvPr id="15" name="TextBox 14">
+            <a:extLst>
+              <a:ext uri="{FF2B5EF4-FFF2-40B4-BE49-F238E27FC236}">
+                <a16:creationId xmlns:a16="http://schemas.microsoft.com/office/drawing/2014/main" id="{EDA8B567-2E77-46B4-AC8C-9FDD1390068F}"/>
+              </a:ext>
+            </a:extLst>
+          </p:cNvPr>
+          <p:cNvSpPr txBox="1"/>
+          <p:nvPr/>
+        </p:nvSpPr>
+        <p:spPr>
+          <a:xfrm>
+            <a:off x="148878" y="4492006"/>
+            <a:ext cx="1780309" cy="646331"/>
+          </a:xfrm>
+          <a:prstGeom prst="rect">
+            <a:avLst/>
+          </a:prstGeom>
+          <a:noFill/>
+        </p:spPr>
+        <p:txBody>
+          <a:bodyPr wrap="square" rtlCol="0">
+            <a:spAutoFit/>
+          </a:bodyPr>
+          <a:lstStyle/>
+          <a:p>
+            <a:pPr algn="ctr"/>
+            <a:r>
+              <a:rPr lang="en-US" dirty="0"/>
+              <a:t>LM19 Temp Sensor</a:t>
+            </a:r>
+          </a:p>
+        </p:txBody>
+      </p:sp>
+      <p:sp>
+        <p:nvSpPr>
+          <p:cNvPr id="16" name="Rectangle 15">
+            <a:extLst>
+              <a:ext uri="{FF2B5EF4-FFF2-40B4-BE49-F238E27FC236}">
+                <a16:creationId xmlns:a16="http://schemas.microsoft.com/office/drawing/2014/main" id="{29474086-BCAD-D340-A6D1-72A96F22E73F}"/>
+              </a:ext>
+            </a:extLst>
+          </p:cNvPr>
+          <p:cNvSpPr/>
+          <p:nvPr/>
+        </p:nvSpPr>
+        <p:spPr>
+          <a:xfrm>
+            <a:off x="1191069" y="5440548"/>
+            <a:ext cx="672718" cy="348062"/>
+          </a:xfrm>
+          <a:prstGeom prst="rect">
+            <a:avLst/>
+          </a:prstGeom>
+          <a:noFill/>
+          <a:ln w="28575"/>
+        </p:spPr>
+        <p:style>
+          <a:lnRef idx="2">
+            <a:schemeClr val="accent1">
+              <a:shade val="15000"/>
+            </a:schemeClr>
+          </a:lnRef>
+          <a:fillRef idx="1">
+            <a:schemeClr val="accent1"/>
+          </a:fillRef>
+          <a:effectRef idx="0">
+            <a:schemeClr val="accent1"/>
+          </a:effectRef>
+          <a:fontRef idx="minor">
+            <a:schemeClr val="lt1"/>
+          </a:fontRef>
+        </p:style>
+        <p:txBody>
+          <a:bodyPr rtlCol="0" anchor="ctr"/>
+          <a:lstStyle/>
+          <a:p>
+            <a:pPr algn="ctr"/>
+            <a:r>
+              <a:rPr lang="en-US" dirty="0"/>
+              <a:t>3.3V</a:t>
+            </a:r>
+          </a:p>
+        </p:txBody>
+      </p:sp>
+      <p:sp>
+        <p:nvSpPr>
+          <p:cNvPr id="17" name="Rectangle 16">
+            <a:extLst>
+              <a:ext uri="{FF2B5EF4-FFF2-40B4-BE49-F238E27FC236}">
+                <a16:creationId xmlns:a16="http://schemas.microsoft.com/office/drawing/2014/main" id="{1921EF80-A6D0-76BB-B693-804B1A1774FA}"/>
+              </a:ext>
+            </a:extLst>
+          </p:cNvPr>
+          <p:cNvSpPr/>
+          <p:nvPr/>
+        </p:nvSpPr>
+        <p:spPr>
+          <a:xfrm>
+            <a:off x="1191069" y="5100095"/>
+            <a:ext cx="672718" cy="348062"/>
+          </a:xfrm>
+          <a:prstGeom prst="rect">
+            <a:avLst/>
+          </a:prstGeom>
+          <a:noFill/>
+          <a:ln w="28575"/>
+        </p:spPr>
+        <p:style>
+          <a:lnRef idx="2">
+            <a:schemeClr val="accent1">
+              <a:shade val="15000"/>
+            </a:schemeClr>
+          </a:lnRef>
+          <a:fillRef idx="1">
+            <a:schemeClr val="accent1"/>
+          </a:fillRef>
+          <a:effectRef idx="0">
+            <a:schemeClr val="accent1"/>
+          </a:effectRef>
+          <a:fontRef idx="minor">
+            <a:schemeClr val="lt1"/>
+          </a:fontRef>
+        </p:style>
+        <p:txBody>
+          <a:bodyPr rtlCol="0" anchor="ctr"/>
+          <a:lstStyle/>
+          <a:p>
+            <a:pPr algn="ctr"/>
+            <a:r>
+              <a:rPr lang="en-US" dirty="0"/>
+              <a:t>OUT</a:t>
+            </a:r>
+          </a:p>
+        </p:txBody>
+      </p:sp>
+      <p:sp>
+        <p:nvSpPr>
+          <p:cNvPr id="26" name="Rectangle 25">
+            <a:extLst>
+              <a:ext uri="{FF2B5EF4-FFF2-40B4-BE49-F238E27FC236}">
+                <a16:creationId xmlns:a16="http://schemas.microsoft.com/office/drawing/2014/main" id="{92A555D6-4464-AE33-EA2D-E9C01570E6E8}"/>
+              </a:ext>
+            </a:extLst>
+          </p:cNvPr>
+          <p:cNvSpPr/>
+          <p:nvPr/>
+        </p:nvSpPr>
+        <p:spPr>
+          <a:xfrm>
+            <a:off x="1191069" y="5800582"/>
+            <a:ext cx="672718" cy="348062"/>
+          </a:xfrm>
+          <a:prstGeom prst="rect">
+            <a:avLst/>
+          </a:prstGeom>
+          <a:noFill/>
+          <a:ln w="28575"/>
+        </p:spPr>
+        <p:style>
+          <a:lnRef idx="2">
+            <a:schemeClr val="accent1">
+              <a:shade val="15000"/>
+            </a:schemeClr>
+          </a:lnRef>
+          <a:fillRef idx="1">
+            <a:schemeClr val="accent1"/>
+          </a:fillRef>
+          <a:effectRef idx="0">
+            <a:schemeClr val="accent1"/>
+          </a:effectRef>
+          <a:fontRef idx="minor">
+            <a:schemeClr val="lt1"/>
+          </a:fontRef>
+        </p:style>
+        <p:txBody>
+          <a:bodyPr rtlCol="0" anchor="ctr"/>
+          <a:lstStyle/>
+          <a:p>
+            <a:pPr algn="ctr"/>
+            <a:r>
+              <a:rPr lang="en-US" dirty="0"/>
+              <a:t>GND</a:t>
+            </a:r>
+          </a:p>
+        </p:txBody>
+      </p:sp>
+      <p:sp>
+        <p:nvSpPr>
+          <p:cNvPr id="28" name="Rectangle 27">
+            <a:extLst>
+              <a:ext uri="{FF2B5EF4-FFF2-40B4-BE49-F238E27FC236}">
+                <a16:creationId xmlns:a16="http://schemas.microsoft.com/office/drawing/2014/main" id="{E10A4152-DAC1-2BB1-2429-D091161552ED}"/>
+              </a:ext>
+            </a:extLst>
+          </p:cNvPr>
+          <p:cNvSpPr/>
+          <p:nvPr/>
+        </p:nvSpPr>
+        <p:spPr>
+          <a:xfrm>
+            <a:off x="2533012" y="5052530"/>
+            <a:ext cx="672718" cy="348062"/>
+          </a:xfrm>
+          <a:prstGeom prst="rect">
+            <a:avLst/>
+          </a:prstGeom>
+          <a:noFill/>
+          <a:ln w="28575"/>
+        </p:spPr>
+        <p:style>
+          <a:lnRef idx="2">
+            <a:schemeClr val="accent1">
+              <a:shade val="15000"/>
+            </a:schemeClr>
+          </a:lnRef>
+          <a:fillRef idx="1">
+            <a:schemeClr val="accent1"/>
+          </a:fillRef>
+          <a:effectRef idx="0">
+            <a:schemeClr val="accent1"/>
+          </a:effectRef>
+          <a:fontRef idx="minor">
+            <a:schemeClr val="lt1"/>
+          </a:fontRef>
+        </p:style>
+        <p:txBody>
+          <a:bodyPr rtlCol="0" anchor="ctr"/>
+          <a:lstStyle/>
+          <a:p>
+            <a:pPr algn="ctr"/>
+            <a:r>
+              <a:rPr lang="en-US" dirty="0"/>
+              <a:t>P1.0</a:t>
+            </a:r>
+          </a:p>
+        </p:txBody>
+      </p:sp>
+      <p:sp>
+        <p:nvSpPr>
+          <p:cNvPr id="29" name="Rectangle 28">
+            <a:extLst>
+              <a:ext uri="{FF2B5EF4-FFF2-40B4-BE49-F238E27FC236}">
+                <a16:creationId xmlns:a16="http://schemas.microsoft.com/office/drawing/2014/main" id="{637BB854-C7B9-A05D-89F6-EAB762B00F3C}"/>
+              </a:ext>
+            </a:extLst>
+          </p:cNvPr>
+          <p:cNvSpPr/>
+          <p:nvPr/>
+        </p:nvSpPr>
+        <p:spPr>
+          <a:xfrm>
+            <a:off x="2533012" y="5412564"/>
+            <a:ext cx="672718" cy="348062"/>
+          </a:xfrm>
+          <a:prstGeom prst="rect">
+            <a:avLst/>
+          </a:prstGeom>
+          <a:noFill/>
+          <a:ln w="28575"/>
+        </p:spPr>
+        <p:style>
+          <a:lnRef idx="2">
+            <a:schemeClr val="accent1">
+              <a:shade val="15000"/>
+            </a:schemeClr>
+          </a:lnRef>
+          <a:fillRef idx="1">
+            <a:schemeClr val="accent1"/>
+          </a:fillRef>
+          <a:effectRef idx="0">
+            <a:schemeClr val="accent1"/>
+          </a:effectRef>
+          <a:fontRef idx="minor">
+            <a:schemeClr val="lt1"/>
+          </a:fontRef>
+        </p:style>
+        <p:txBody>
+          <a:bodyPr rtlCol="0" anchor="ctr"/>
+          <a:lstStyle/>
+          <a:p>
+            <a:pPr algn="ctr"/>
+            <a:r>
+              <a:rPr lang="en-US" dirty="0"/>
+              <a:t>3.3V</a:t>
+            </a:r>
+          </a:p>
+        </p:txBody>
+      </p:sp>
+      <p:sp>
+        <p:nvSpPr>
+          <p:cNvPr id="40" name="Rectangle 39">
+            <a:extLst>
+              <a:ext uri="{FF2B5EF4-FFF2-40B4-BE49-F238E27FC236}">
+                <a16:creationId xmlns:a16="http://schemas.microsoft.com/office/drawing/2014/main" id="{FAAEA2F9-B6AA-3987-3959-25D32E50C203}"/>
+              </a:ext>
+            </a:extLst>
+          </p:cNvPr>
+          <p:cNvSpPr/>
+          <p:nvPr/>
+        </p:nvSpPr>
+        <p:spPr>
+          <a:xfrm>
+            <a:off x="2527936" y="5755568"/>
+            <a:ext cx="672718" cy="348062"/>
+          </a:xfrm>
+          <a:prstGeom prst="rect">
+            <a:avLst/>
+          </a:prstGeom>
+          <a:noFill/>
+          <a:ln w="28575"/>
+        </p:spPr>
+        <p:style>
+          <a:lnRef idx="2">
+            <a:schemeClr val="accent1">
+              <a:shade val="15000"/>
+            </a:schemeClr>
+          </a:lnRef>
+          <a:fillRef idx="1">
+            <a:schemeClr val="accent1"/>
+          </a:fillRef>
+          <a:effectRef idx="0">
+            <a:schemeClr val="accent1"/>
+          </a:effectRef>
+          <a:fontRef idx="minor">
+            <a:schemeClr val="lt1"/>
+          </a:fontRef>
+        </p:style>
+        <p:txBody>
+          <a:bodyPr rtlCol="0" anchor="ctr"/>
+          <a:lstStyle/>
+          <a:p>
+            <a:pPr algn="ctr"/>
+            <a:r>
+              <a:rPr lang="en-US" dirty="0"/>
+              <a:t>GND</a:t>
+            </a:r>
+          </a:p>
+        </p:txBody>
+      </p:sp>
+      <p:cxnSp>
+        <p:nvCxnSpPr>
+          <p:cNvPr id="41" name="Straight Connector 40">
+            <a:extLst>
+              <a:ext uri="{FF2B5EF4-FFF2-40B4-BE49-F238E27FC236}">
+                <a16:creationId xmlns:a16="http://schemas.microsoft.com/office/drawing/2014/main" id="{6F5431DB-BCBF-0F42-3EAA-24D31AB96528}"/>
+              </a:ext>
+            </a:extLst>
+          </p:cNvPr>
+          <p:cNvCxnSpPr>
+            <a:cxnSpLocks/>
+          </p:cNvCxnSpPr>
+          <p:nvPr/>
+        </p:nvCxnSpPr>
+        <p:spPr>
+          <a:xfrm>
+            <a:off x="1857559" y="5264579"/>
+            <a:ext cx="672583" cy="2916"/>
+          </a:xfrm>
+          <a:prstGeom prst="line">
+            <a:avLst/>
+          </a:prstGeom>
+          <a:ln w="28575"/>
+        </p:spPr>
+        <p:style>
+          <a:lnRef idx="2">
+            <a:schemeClr val="dk1"/>
+          </a:lnRef>
+          <a:fillRef idx="0">
+            <a:schemeClr val="dk1"/>
+          </a:fillRef>
+          <a:effectRef idx="1">
+            <a:schemeClr val="dk1"/>
+          </a:effectRef>
+          <a:fontRef idx="minor">
+            <a:schemeClr val="tx1"/>
+          </a:fontRef>
+        </p:style>
+      </p:cxnSp>
+      <p:cxnSp>
+        <p:nvCxnSpPr>
+          <p:cNvPr id="42" name="Straight Connector 41">
+            <a:extLst>
+              <a:ext uri="{FF2B5EF4-FFF2-40B4-BE49-F238E27FC236}">
+                <a16:creationId xmlns:a16="http://schemas.microsoft.com/office/drawing/2014/main" id="{5C0107CF-1D9D-DECC-0F8A-64AC6A16F612}"/>
+              </a:ext>
+            </a:extLst>
+          </p:cNvPr>
+          <p:cNvCxnSpPr>
+            <a:cxnSpLocks/>
+          </p:cNvCxnSpPr>
+          <p:nvPr/>
+        </p:nvCxnSpPr>
+        <p:spPr>
+          <a:xfrm>
+            <a:off x="1857559" y="5612641"/>
+            <a:ext cx="672583" cy="2916"/>
+          </a:xfrm>
+          <a:prstGeom prst="line">
+            <a:avLst/>
+          </a:prstGeom>
+          <a:ln w="28575"/>
+        </p:spPr>
+        <p:style>
+          <a:lnRef idx="2">
+            <a:schemeClr val="dk1"/>
+          </a:lnRef>
+          <a:fillRef idx="0">
+            <a:schemeClr val="dk1"/>
+          </a:fillRef>
+          <a:effectRef idx="1">
+            <a:schemeClr val="dk1"/>
+          </a:effectRef>
+          <a:fontRef idx="minor">
+            <a:schemeClr val="tx1"/>
+          </a:fontRef>
+        </p:style>
+      </p:cxnSp>
+      <p:cxnSp>
+        <p:nvCxnSpPr>
+          <p:cNvPr id="43" name="Straight Connector 42">
+            <a:extLst>
+              <a:ext uri="{FF2B5EF4-FFF2-40B4-BE49-F238E27FC236}">
+                <a16:creationId xmlns:a16="http://schemas.microsoft.com/office/drawing/2014/main" id="{7BA8E72C-0DB9-1807-04FD-31DCA00F59E8}"/>
+              </a:ext>
+            </a:extLst>
+          </p:cNvPr>
+          <p:cNvCxnSpPr>
+            <a:cxnSpLocks/>
+          </p:cNvCxnSpPr>
+          <p:nvPr/>
+        </p:nvCxnSpPr>
+        <p:spPr>
+          <a:xfrm>
+            <a:off x="1857559" y="5959869"/>
+            <a:ext cx="672582" cy="2916"/>
+          </a:xfrm>
+          <a:prstGeom prst="line">
+            <a:avLst/>
+          </a:prstGeom>
+          <a:ln w="28575"/>
+        </p:spPr>
+        <p:style>
+          <a:lnRef idx="2">
+            <a:schemeClr val="dk1"/>
+          </a:lnRef>
+          <a:fillRef idx="0">
+            <a:schemeClr val="dk1"/>
+          </a:fillRef>
+          <a:effectRef idx="1">
+            <a:schemeClr val="dk1"/>
+          </a:effectRef>
+          <a:fontRef idx="minor">
+            <a:schemeClr val="tx1"/>
+          </a:fontRef>
+        </p:style>
+      </p:cxnSp>
     </p:spTree>
     <p:extLst>
       <p:ext uri="{BB962C8B-B14F-4D97-AF65-F5344CB8AC3E}">

</xml_diff>

<commit_message>
organizing documents for demo
</commit_message>
<xml_diff>
--- a/docs/planning/proj5_circuit_diagram.pptx
+++ b/docs/planning/proj5_circuit_diagram.pptx
@@ -677,12 +677,12 @@
   <pc:docChgLst>
     <pc:chgData name="Jay Graham" userId="95e8df3011c311b3" providerId="LiveId" clId="{EA3D4833-2490-46CA-9B72-58AA6B3A474E}"/>
     <pc:docChg chg="undo custSel modSld">
-      <pc:chgData name="Jay Graham" userId="95e8df3011c311b3" providerId="LiveId" clId="{EA3D4833-2490-46CA-9B72-58AA6B3A474E}" dt="2025-04-01T16:50:19.361" v="92" actId="1076"/>
+      <pc:chgData name="Jay Graham" userId="95e8df3011c311b3" providerId="LiveId" clId="{EA3D4833-2490-46CA-9B72-58AA6B3A474E}" dt="2025-04-08T04:23:00.303" v="96" actId="20577"/>
       <pc:docMkLst>
         <pc:docMk/>
       </pc:docMkLst>
       <pc:sldChg chg="addSp delSp modSp mod">
-        <pc:chgData name="Jay Graham" userId="95e8df3011c311b3" providerId="LiveId" clId="{EA3D4833-2490-46CA-9B72-58AA6B3A474E}" dt="2025-04-01T16:50:19.361" v="92" actId="1076"/>
+        <pc:chgData name="Jay Graham" userId="95e8df3011c311b3" providerId="LiveId" clId="{EA3D4833-2490-46CA-9B72-58AA6B3A474E}" dt="2025-04-08T04:23:00.303" v="96" actId="20577"/>
         <pc:sldMkLst>
           <pc:docMk/>
           <pc:sldMk cId="2796565901" sldId="259"/>
@@ -743,14 +743,6 @@
             <ac:spMk id="26" creationId="{92A555D6-4464-AE33-EA2D-E9C01570E6E8}"/>
           </ac:spMkLst>
         </pc:spChg>
-        <pc:spChg chg="add del mod">
-          <ac:chgData name="Jay Graham" userId="95e8df3011c311b3" providerId="LiveId" clId="{EA3D4833-2490-46CA-9B72-58AA6B3A474E}" dt="2025-04-01T16:47:11.206" v="60" actId="478"/>
-          <ac:spMkLst>
-            <pc:docMk/>
-            <pc:sldMk cId="2796565901" sldId="259"/>
-            <ac:spMk id="27" creationId="{EEC9F28A-9C0A-4C10-9B49-2A9DFCDB067C}"/>
-          </ac:spMkLst>
-        </pc:spChg>
         <pc:spChg chg="add mod">
           <ac:chgData name="Jay Graham" userId="95e8df3011c311b3" providerId="LiveId" clId="{EA3D4833-2490-46CA-9B72-58AA6B3A474E}" dt="2025-04-01T16:49:52.770" v="89" actId="20577"/>
           <ac:spMkLst>
@@ -837,6 +829,14 @@
             <pc:docMk/>
             <pc:sldMk cId="2796565901" sldId="259"/>
             <ac:spMk id="1081" creationId="{D158BF25-C383-E8F4-523A-702B606B6ED1}"/>
+          </ac:spMkLst>
+        </pc:spChg>
+        <pc:spChg chg="mod">
+          <ac:chgData name="Jay Graham" userId="95e8df3011c311b3" providerId="LiveId" clId="{EA3D4833-2490-46CA-9B72-58AA6B3A474E}" dt="2025-04-08T04:23:00.303" v="96" actId="20577"/>
+          <ac:spMkLst>
+            <pc:docMk/>
+            <pc:sldMk cId="2796565901" sldId="259"/>
+            <ac:spMk id="1138" creationId="{02914594-83E9-DEF8-F95B-4CF500CE62E0}"/>
           </ac:spMkLst>
         </pc:spChg>
         <pc:cxnChg chg="add mod">
@@ -1383,7 +1383,7 @@
           <a:p>
             <a:fld id="{298767BF-8302-47B2-9BB9-DDE0834E9382}" type="datetimeFigureOut">
               <a:rPr lang="en-US" smtClean="0"/>
-              <a:t>4/1/2025</a:t>
+              <a:t>4/7/2025</a:t>
             </a:fld>
             <a:endParaRPr lang="en-US"/>
           </a:p>
@@ -1581,7 +1581,7 @@
           <a:p>
             <a:fld id="{298767BF-8302-47B2-9BB9-DDE0834E9382}" type="datetimeFigureOut">
               <a:rPr lang="en-US" smtClean="0"/>
-              <a:t>4/1/2025</a:t>
+              <a:t>4/7/2025</a:t>
             </a:fld>
             <a:endParaRPr lang="en-US"/>
           </a:p>
@@ -1789,7 +1789,7 @@
           <a:p>
             <a:fld id="{298767BF-8302-47B2-9BB9-DDE0834E9382}" type="datetimeFigureOut">
               <a:rPr lang="en-US" smtClean="0"/>
-              <a:t>4/1/2025</a:t>
+              <a:t>4/7/2025</a:t>
             </a:fld>
             <a:endParaRPr lang="en-US"/>
           </a:p>
@@ -1987,7 +1987,7 @@
           <a:p>
             <a:fld id="{298767BF-8302-47B2-9BB9-DDE0834E9382}" type="datetimeFigureOut">
               <a:rPr lang="en-US" smtClean="0"/>
-              <a:t>4/1/2025</a:t>
+              <a:t>4/7/2025</a:t>
             </a:fld>
             <a:endParaRPr lang="en-US"/>
           </a:p>
@@ -2262,7 +2262,7 @@
           <a:p>
             <a:fld id="{298767BF-8302-47B2-9BB9-DDE0834E9382}" type="datetimeFigureOut">
               <a:rPr lang="en-US" smtClean="0"/>
-              <a:t>4/1/2025</a:t>
+              <a:t>4/7/2025</a:t>
             </a:fld>
             <a:endParaRPr lang="en-US"/>
           </a:p>
@@ -2527,7 +2527,7 @@
           <a:p>
             <a:fld id="{298767BF-8302-47B2-9BB9-DDE0834E9382}" type="datetimeFigureOut">
               <a:rPr lang="en-US" smtClean="0"/>
-              <a:t>4/1/2025</a:t>
+              <a:t>4/7/2025</a:t>
             </a:fld>
             <a:endParaRPr lang="en-US"/>
           </a:p>
@@ -2939,7 +2939,7 @@
           <a:p>
             <a:fld id="{298767BF-8302-47B2-9BB9-DDE0834E9382}" type="datetimeFigureOut">
               <a:rPr lang="en-US" smtClean="0"/>
-              <a:t>4/1/2025</a:t>
+              <a:t>4/7/2025</a:t>
             </a:fld>
             <a:endParaRPr lang="en-US"/>
           </a:p>
@@ -3080,7 +3080,7 @@
           <a:p>
             <a:fld id="{298767BF-8302-47B2-9BB9-DDE0834E9382}" type="datetimeFigureOut">
               <a:rPr lang="en-US" smtClean="0"/>
-              <a:t>4/1/2025</a:t>
+              <a:t>4/7/2025</a:t>
             </a:fld>
             <a:endParaRPr lang="en-US"/>
           </a:p>
@@ -3193,7 +3193,7 @@
           <a:p>
             <a:fld id="{298767BF-8302-47B2-9BB9-DDE0834E9382}" type="datetimeFigureOut">
               <a:rPr lang="en-US" smtClean="0"/>
-              <a:t>4/1/2025</a:t>
+              <a:t>4/7/2025</a:t>
             </a:fld>
             <a:endParaRPr lang="en-US"/>
           </a:p>
@@ -3504,7 +3504,7 @@
           <a:p>
             <a:fld id="{298767BF-8302-47B2-9BB9-DDE0834E9382}" type="datetimeFigureOut">
               <a:rPr lang="en-US" smtClean="0"/>
-              <a:t>4/1/2025</a:t>
+              <a:t>4/7/2025</a:t>
             </a:fld>
             <a:endParaRPr lang="en-US"/>
           </a:p>
@@ -3792,7 +3792,7 @@
           <a:p>
             <a:fld id="{298767BF-8302-47B2-9BB9-DDE0834E9382}" type="datetimeFigureOut">
               <a:rPr lang="en-US" smtClean="0"/>
-              <a:t>4/1/2025</a:t>
+              <a:t>4/7/2025</a:t>
             </a:fld>
             <a:endParaRPr lang="en-US"/>
           </a:p>
@@ -4033,7 +4033,7 @@
           <a:p>
             <a:fld id="{298767BF-8302-47B2-9BB9-DDE0834E9382}" type="datetimeFigureOut">
               <a:rPr lang="en-US" smtClean="0"/>
-              <a:t>4/1/2025</a:t>
+              <a:t>4/7/2025</a:t>
             </a:fld>
             <a:endParaRPr lang="en-US"/>
           </a:p>
@@ -6571,7 +6571,7 @@
             <a:pPr algn="ctr"/>
             <a:r>
               <a:rPr lang="en-US" dirty="0"/>
-              <a:t>MSP430FR2311</a:t>
+              <a:t>MSP430FR2355</a:t>
             </a:r>
           </a:p>
           <a:p>

</xml_diff>